<commit_message>
MGEFA with sex complete
Needs assembly in ppt
</commit_message>
<xml_diff>
--- a/graphs/enzmann_mlfa_2.pptx
+++ b/graphs/enzmann_mlfa_2.pptx
@@ -7,6 +7,8 @@
   <p:sldIdLst>
     <p:sldId id="256" r:id="rId2"/>
     <p:sldId id="257" r:id="rId3"/>
+    <p:sldId id="258" r:id="rId4"/>
+    <p:sldId id="259" r:id="rId5"/>
   </p:sldIdLst>
   <p:sldSz cx="9144000" cy="6858000" type="screen4x3"/>
   <p:notesSz cx="6858000" cy="9144000"/>
@@ -289,7 +291,7 @@
           <a:p>
             <a:fld id="{1264DBC4-B84B-4FB6-B153-678F1BA44215}" type="datetimeFigureOut">
               <a:rPr lang="en-US" smtClean="0"/>
-              <a:t>7/13/2013</a:t>
+              <a:t>7/14/2013</a:t>
             </a:fld>
             <a:endParaRPr lang="en-US"/>
           </a:p>
@@ -459,7 +461,7 @@
           <a:p>
             <a:fld id="{1264DBC4-B84B-4FB6-B153-678F1BA44215}" type="datetimeFigureOut">
               <a:rPr lang="en-US" smtClean="0"/>
-              <a:t>7/13/2013</a:t>
+              <a:t>7/14/2013</a:t>
             </a:fld>
             <a:endParaRPr lang="en-US"/>
           </a:p>
@@ -639,7 +641,7 @@
           <a:p>
             <a:fld id="{1264DBC4-B84B-4FB6-B153-678F1BA44215}" type="datetimeFigureOut">
               <a:rPr lang="en-US" smtClean="0"/>
-              <a:t>7/13/2013</a:t>
+              <a:t>7/14/2013</a:t>
             </a:fld>
             <a:endParaRPr lang="en-US"/>
           </a:p>
@@ -809,7 +811,7 @@
           <a:p>
             <a:fld id="{1264DBC4-B84B-4FB6-B153-678F1BA44215}" type="datetimeFigureOut">
               <a:rPr lang="en-US" smtClean="0"/>
-              <a:t>7/13/2013</a:t>
+              <a:t>7/14/2013</a:t>
             </a:fld>
             <a:endParaRPr lang="en-US"/>
           </a:p>
@@ -1055,7 +1057,7 @@
           <a:p>
             <a:fld id="{1264DBC4-B84B-4FB6-B153-678F1BA44215}" type="datetimeFigureOut">
               <a:rPr lang="en-US" smtClean="0"/>
-              <a:t>7/13/2013</a:t>
+              <a:t>7/14/2013</a:t>
             </a:fld>
             <a:endParaRPr lang="en-US"/>
           </a:p>
@@ -1343,7 +1345,7 @@
           <a:p>
             <a:fld id="{1264DBC4-B84B-4FB6-B153-678F1BA44215}" type="datetimeFigureOut">
               <a:rPr lang="en-US" smtClean="0"/>
-              <a:t>7/13/2013</a:t>
+              <a:t>7/14/2013</a:t>
             </a:fld>
             <a:endParaRPr lang="en-US"/>
           </a:p>
@@ -1765,7 +1767,7 @@
           <a:p>
             <a:fld id="{1264DBC4-B84B-4FB6-B153-678F1BA44215}" type="datetimeFigureOut">
               <a:rPr lang="en-US" smtClean="0"/>
-              <a:t>7/13/2013</a:t>
+              <a:t>7/14/2013</a:t>
             </a:fld>
             <a:endParaRPr lang="en-US"/>
           </a:p>
@@ -1883,7 +1885,7 @@
           <a:p>
             <a:fld id="{1264DBC4-B84B-4FB6-B153-678F1BA44215}" type="datetimeFigureOut">
               <a:rPr lang="en-US" smtClean="0"/>
-              <a:t>7/13/2013</a:t>
+              <a:t>7/14/2013</a:t>
             </a:fld>
             <a:endParaRPr lang="en-US"/>
           </a:p>
@@ -1978,7 +1980,7 @@
           <a:p>
             <a:fld id="{1264DBC4-B84B-4FB6-B153-678F1BA44215}" type="datetimeFigureOut">
               <a:rPr lang="en-US" smtClean="0"/>
-              <a:t>7/13/2013</a:t>
+              <a:t>7/14/2013</a:t>
             </a:fld>
             <a:endParaRPr lang="en-US"/>
           </a:p>
@@ -2255,7 +2257,7 @@
           <a:p>
             <a:fld id="{1264DBC4-B84B-4FB6-B153-678F1BA44215}" type="datetimeFigureOut">
               <a:rPr lang="en-US" smtClean="0"/>
-              <a:t>7/13/2013</a:t>
+              <a:t>7/14/2013</a:t>
             </a:fld>
             <a:endParaRPr lang="en-US"/>
           </a:p>
@@ -2508,7 +2510,7 @@
           <a:p>
             <a:fld id="{1264DBC4-B84B-4FB6-B153-678F1BA44215}" type="datetimeFigureOut">
               <a:rPr lang="en-US" smtClean="0"/>
-              <a:t>7/13/2013</a:t>
+              <a:t>7/14/2013</a:t>
             </a:fld>
             <a:endParaRPr lang="en-US"/>
           </a:p>
@@ -2721,7 +2723,7 @@
           <a:p>
             <a:fld id="{1264DBC4-B84B-4FB6-B153-678F1BA44215}" type="datetimeFigureOut">
               <a:rPr lang="en-US" smtClean="0"/>
-              <a:t>7/13/2013</a:t>
+              <a:t>7/14/2013</a:t>
             </a:fld>
             <a:endParaRPr lang="en-US"/>
           </a:p>
@@ -4517,6 +4519,1460 @@
     <p:extLst>
       <p:ext uri="{BB962C8B-B14F-4D97-AF65-F5344CB8AC3E}">
         <p14:creationId xmlns:p14="http://schemas.microsoft.com/office/powerpoint/2010/main" val="3494579744"/>
+      </p:ext>
+    </p:extLst>
+  </p:cSld>
+  <p:clrMapOvr>
+    <a:masterClrMapping/>
+  </p:clrMapOvr>
+  <p:timing>
+    <p:tnLst>
+      <p:par>
+        <p:cTn id="1" dur="indefinite" restart="never" nodeType="tmRoot"/>
+      </p:par>
+    </p:tnLst>
+  </p:timing>
+</p:sld>
+</file>
+
+<file path=ppt/slides/slide3.xml><?xml version="1.0" encoding="utf-8"?>
+<p:sld xmlns:a="http://schemas.openxmlformats.org/drawingml/2006/main" xmlns:r="http://schemas.openxmlformats.org/officeDocument/2006/relationships" xmlns:p="http://schemas.openxmlformats.org/presentationml/2006/main">
+  <p:cSld>
+    <p:spTree>
+      <p:nvGrpSpPr>
+        <p:cNvPr id="1" name=""/>
+        <p:cNvGrpSpPr/>
+        <p:nvPr/>
+      </p:nvGrpSpPr>
+      <p:grpSpPr>
+        <a:xfrm>
+          <a:off x="0" y="0"/>
+          <a:ext cx="0" cy="0"/>
+          <a:chOff x="0" y="0"/>
+          <a:chExt cx="0" cy="0"/>
+        </a:xfrm>
+      </p:grpSpPr>
+      <p:pic>
+        <p:nvPicPr>
+          <p:cNvPr id="9" name="Picture 8"/>
+          <p:cNvPicPr>
+            <a:picLocks noChangeAspect="1"/>
+          </p:cNvPicPr>
+          <p:nvPr/>
+        </p:nvPicPr>
+        <p:blipFill>
+          <a:blip r:embed="rId2" cstate="print">
+            <a:extLst>
+              <a:ext uri="{28A0092B-C50C-407E-A947-70E740481C1C}">
+                <a14:useLocalDpi xmlns:a14="http://schemas.microsoft.com/office/drawing/2010/main" val="0"/>
+              </a:ext>
+            </a:extLst>
+          </a:blip>
+          <a:stretch>
+            <a:fillRect/>
+          </a:stretch>
+        </p:blipFill>
+        <p:spPr>
+          <a:xfrm rot="5400000">
+            <a:off x="437265" y="3620302"/>
+            <a:ext cx="1463041" cy="822960"/>
+          </a:xfrm>
+          <a:prstGeom prst="rect">
+            <a:avLst/>
+          </a:prstGeom>
+        </p:spPr>
+      </p:pic>
+      <p:pic>
+        <p:nvPicPr>
+          <p:cNvPr id="10" name="Picture 9"/>
+          <p:cNvPicPr>
+            <a:picLocks noChangeAspect="1"/>
+          </p:cNvPicPr>
+          <p:nvPr/>
+        </p:nvPicPr>
+        <p:blipFill>
+          <a:blip r:embed="rId3" cstate="print">
+            <a:extLst>
+              <a:ext uri="{28A0092B-C50C-407E-A947-70E740481C1C}">
+                <a14:useLocalDpi xmlns:a14="http://schemas.microsoft.com/office/drawing/2010/main" val="0"/>
+              </a:ext>
+            </a:extLst>
+          </a:blip>
+          <a:stretch>
+            <a:fillRect/>
+          </a:stretch>
+        </p:blipFill>
+        <p:spPr>
+          <a:xfrm rot="5400000">
+            <a:off x="1446030" y="3620302"/>
+            <a:ext cx="1463041" cy="822960"/>
+          </a:xfrm>
+          <a:prstGeom prst="rect">
+            <a:avLst/>
+          </a:prstGeom>
+        </p:spPr>
+      </p:pic>
+      <p:pic>
+        <p:nvPicPr>
+          <p:cNvPr id="11" name="Picture 10"/>
+          <p:cNvPicPr>
+            <a:picLocks noChangeAspect="1"/>
+          </p:cNvPicPr>
+          <p:nvPr/>
+        </p:nvPicPr>
+        <p:blipFill>
+          <a:blip r:embed="rId4" cstate="print">
+            <a:extLst>
+              <a:ext uri="{28A0092B-C50C-407E-A947-70E740481C1C}">
+                <a14:useLocalDpi xmlns:a14="http://schemas.microsoft.com/office/drawing/2010/main" val="0"/>
+              </a:ext>
+            </a:extLst>
+          </a:blip>
+          <a:stretch>
+            <a:fillRect/>
+          </a:stretch>
+        </p:blipFill>
+        <p:spPr>
+          <a:xfrm rot="5400000">
+            <a:off x="2454918" y="3620302"/>
+            <a:ext cx="1463041" cy="822960"/>
+          </a:xfrm>
+          <a:prstGeom prst="rect">
+            <a:avLst/>
+          </a:prstGeom>
+        </p:spPr>
+      </p:pic>
+      <p:pic>
+        <p:nvPicPr>
+          <p:cNvPr id="13" name="Picture 12"/>
+          <p:cNvPicPr>
+            <a:picLocks noChangeAspect="1"/>
+          </p:cNvPicPr>
+          <p:nvPr/>
+        </p:nvPicPr>
+        <p:blipFill>
+          <a:blip r:embed="rId5" cstate="print">
+            <a:extLst>
+              <a:ext uri="{28A0092B-C50C-407E-A947-70E740481C1C}">
+                <a14:useLocalDpi xmlns:a14="http://schemas.microsoft.com/office/drawing/2010/main" val="0"/>
+              </a:ext>
+            </a:extLst>
+          </a:blip>
+          <a:stretch>
+            <a:fillRect/>
+          </a:stretch>
+        </p:blipFill>
+        <p:spPr>
+          <a:xfrm rot="5400000">
+            <a:off x="437265" y="5296702"/>
+            <a:ext cx="1463041" cy="822960"/>
+          </a:xfrm>
+          <a:prstGeom prst="rect">
+            <a:avLst/>
+          </a:prstGeom>
+        </p:spPr>
+      </p:pic>
+      <p:pic>
+        <p:nvPicPr>
+          <p:cNvPr id="14" name="Picture 13"/>
+          <p:cNvPicPr>
+            <a:picLocks noChangeAspect="1"/>
+          </p:cNvPicPr>
+          <p:nvPr/>
+        </p:nvPicPr>
+        <p:blipFill>
+          <a:blip r:embed="rId6" cstate="print">
+            <a:extLst>
+              <a:ext uri="{28A0092B-C50C-407E-A947-70E740481C1C}">
+                <a14:useLocalDpi xmlns:a14="http://schemas.microsoft.com/office/drawing/2010/main" val="0"/>
+              </a:ext>
+            </a:extLst>
+          </a:blip>
+          <a:stretch>
+            <a:fillRect/>
+          </a:stretch>
+        </p:blipFill>
+        <p:spPr>
+          <a:xfrm rot="5400000">
+            <a:off x="1446092" y="5296702"/>
+            <a:ext cx="1463041" cy="822960"/>
+          </a:xfrm>
+          <a:prstGeom prst="rect">
+            <a:avLst/>
+          </a:prstGeom>
+        </p:spPr>
+      </p:pic>
+      <p:pic>
+        <p:nvPicPr>
+          <p:cNvPr id="15" name="Picture 14"/>
+          <p:cNvPicPr>
+            <a:picLocks noChangeAspect="1"/>
+          </p:cNvPicPr>
+          <p:nvPr/>
+        </p:nvPicPr>
+        <p:blipFill>
+          <a:blip r:embed="rId7" cstate="print">
+            <a:extLst>
+              <a:ext uri="{28A0092B-C50C-407E-A947-70E740481C1C}">
+                <a14:useLocalDpi xmlns:a14="http://schemas.microsoft.com/office/drawing/2010/main" val="0"/>
+              </a:ext>
+            </a:extLst>
+          </a:blip>
+          <a:stretch>
+            <a:fillRect/>
+          </a:stretch>
+        </p:blipFill>
+        <p:spPr>
+          <a:xfrm rot="5400000">
+            <a:off x="2454919" y="5296702"/>
+            <a:ext cx="1463041" cy="822960"/>
+          </a:xfrm>
+          <a:prstGeom prst="rect">
+            <a:avLst/>
+          </a:prstGeom>
+        </p:spPr>
+      </p:pic>
+      <p:pic>
+        <p:nvPicPr>
+          <p:cNvPr id="16" name="Picture 15"/>
+          <p:cNvPicPr>
+            <a:picLocks noChangeAspect="1"/>
+          </p:cNvPicPr>
+          <p:nvPr/>
+        </p:nvPicPr>
+        <p:blipFill>
+          <a:blip r:embed="rId8" cstate="print">
+            <a:extLst>
+              <a:ext uri="{28A0092B-C50C-407E-A947-70E740481C1C}">
+                <a14:useLocalDpi xmlns:a14="http://schemas.microsoft.com/office/drawing/2010/main" val="0"/>
+              </a:ext>
+            </a:extLst>
+          </a:blip>
+          <a:stretch>
+            <a:fillRect/>
+          </a:stretch>
+        </p:blipFill>
+        <p:spPr>
+          <a:xfrm rot="5400000">
+            <a:off x="437264" y="1943902"/>
+            <a:ext cx="1463041" cy="822960"/>
+          </a:xfrm>
+          <a:prstGeom prst="rect">
+            <a:avLst/>
+          </a:prstGeom>
+        </p:spPr>
+      </p:pic>
+      <p:pic>
+        <p:nvPicPr>
+          <p:cNvPr id="17" name="Picture 16"/>
+          <p:cNvPicPr>
+            <a:picLocks noChangeAspect="1"/>
+          </p:cNvPicPr>
+          <p:nvPr/>
+        </p:nvPicPr>
+        <p:blipFill>
+          <a:blip r:embed="rId9" cstate="print">
+            <a:extLst>
+              <a:ext uri="{28A0092B-C50C-407E-A947-70E740481C1C}">
+                <a14:useLocalDpi xmlns:a14="http://schemas.microsoft.com/office/drawing/2010/main" val="0"/>
+              </a:ext>
+            </a:extLst>
+          </a:blip>
+          <a:stretch>
+            <a:fillRect/>
+          </a:stretch>
+        </p:blipFill>
+        <p:spPr>
+          <a:xfrm rot="5400000">
+            <a:off x="1446092" y="1943902"/>
+            <a:ext cx="1463041" cy="822960"/>
+          </a:xfrm>
+          <a:prstGeom prst="rect">
+            <a:avLst/>
+          </a:prstGeom>
+        </p:spPr>
+      </p:pic>
+      <p:pic>
+        <p:nvPicPr>
+          <p:cNvPr id="18" name="Picture 17"/>
+          <p:cNvPicPr>
+            <a:picLocks noChangeAspect="1"/>
+          </p:cNvPicPr>
+          <p:nvPr/>
+        </p:nvPicPr>
+        <p:blipFill>
+          <a:blip r:embed="rId10" cstate="print">
+            <a:extLst>
+              <a:ext uri="{28A0092B-C50C-407E-A947-70E740481C1C}">
+                <a14:useLocalDpi xmlns:a14="http://schemas.microsoft.com/office/drawing/2010/main" val="0"/>
+              </a:ext>
+            </a:extLst>
+          </a:blip>
+          <a:stretch>
+            <a:fillRect/>
+          </a:stretch>
+        </p:blipFill>
+        <p:spPr>
+          <a:xfrm rot="5400000">
+            <a:off x="2454919" y="1943902"/>
+            <a:ext cx="1463041" cy="822960"/>
+          </a:xfrm>
+          <a:prstGeom prst="rect">
+            <a:avLst/>
+          </a:prstGeom>
+        </p:spPr>
+      </p:pic>
+      <p:sp>
+        <p:nvSpPr>
+          <p:cNvPr id="19" name="TextBox 18"/>
+          <p:cNvSpPr txBox="1"/>
+          <p:nvPr/>
+        </p:nvSpPr>
+        <p:spPr>
+          <a:xfrm>
+            <a:off x="869701" y="1317790"/>
+            <a:ext cx="776175" cy="261610"/>
+          </a:xfrm>
+          <a:prstGeom prst="rect">
+            <a:avLst/>
+          </a:prstGeom>
+          <a:noFill/>
+        </p:spPr>
+        <p:txBody>
+          <a:bodyPr wrap="none" rtlCol="0">
+            <a:spAutoFit/>
+          </a:bodyPr>
+          <a:lstStyle/>
+          <a:p>
+            <a:r>
+              <a:rPr lang="en-US" sz="1050" dirty="0" smtClean="0"/>
+              <a:t>Unrotated</a:t>
+            </a:r>
+            <a:endParaRPr lang="en-US" sz="1050" dirty="0"/>
+          </a:p>
+        </p:txBody>
+      </p:sp>
+      <p:sp>
+        <p:nvSpPr>
+          <p:cNvPr id="20" name="TextBox 19"/>
+          <p:cNvSpPr txBox="1"/>
+          <p:nvPr/>
+        </p:nvSpPr>
+        <p:spPr>
+          <a:xfrm>
+            <a:off x="1952557" y="1319050"/>
+            <a:ext cx="631904" cy="253916"/>
+          </a:xfrm>
+          <a:prstGeom prst="rect">
+            <a:avLst/>
+          </a:prstGeom>
+          <a:noFill/>
+        </p:spPr>
+        <p:txBody>
+          <a:bodyPr wrap="none" rtlCol="0">
+            <a:spAutoFit/>
+          </a:bodyPr>
+          <a:lstStyle/>
+          <a:p>
+            <a:r>
+              <a:rPr lang="en-US" sz="1050" dirty="0" smtClean="0"/>
+              <a:t>Varimax</a:t>
+            </a:r>
+            <a:endParaRPr lang="en-US" sz="1050" dirty="0"/>
+          </a:p>
+        </p:txBody>
+      </p:sp>
+      <p:sp>
+        <p:nvSpPr>
+          <p:cNvPr id="21" name="TextBox 20"/>
+          <p:cNvSpPr txBox="1"/>
+          <p:nvPr/>
+        </p:nvSpPr>
+        <p:spPr>
+          <a:xfrm>
+            <a:off x="2971551" y="1317790"/>
+            <a:ext cx="599844" cy="253916"/>
+          </a:xfrm>
+          <a:prstGeom prst="rect">
+            <a:avLst/>
+          </a:prstGeom>
+          <a:noFill/>
+        </p:spPr>
+        <p:txBody>
+          <a:bodyPr wrap="none" rtlCol="0">
+            <a:spAutoFit/>
+          </a:bodyPr>
+          <a:lstStyle/>
+          <a:p>
+            <a:r>
+              <a:rPr lang="en-US" sz="1050" dirty="0" smtClean="0"/>
+              <a:t>Promax</a:t>
+            </a:r>
+            <a:endParaRPr lang="en-US" sz="1050" dirty="0"/>
+          </a:p>
+        </p:txBody>
+      </p:sp>
+      <p:sp>
+        <p:nvSpPr>
+          <p:cNvPr id="22" name="TextBox 21"/>
+          <p:cNvSpPr txBox="1"/>
+          <p:nvPr/>
+        </p:nvSpPr>
+        <p:spPr>
+          <a:xfrm>
+            <a:off x="786528" y="4724399"/>
+            <a:ext cx="740908" cy="253916"/>
+          </a:xfrm>
+          <a:prstGeom prst="rect">
+            <a:avLst/>
+          </a:prstGeom>
+          <a:noFill/>
+        </p:spPr>
+        <p:txBody>
+          <a:bodyPr wrap="none" rtlCol="0">
+            <a:spAutoFit/>
+          </a:bodyPr>
+          <a:lstStyle/>
+          <a:p>
+            <a:r>
+              <a:rPr lang="en-US" sz="1050" dirty="0" smtClean="0"/>
+              <a:t>Quartimin</a:t>
+            </a:r>
+            <a:endParaRPr lang="en-US" sz="1050" dirty="0"/>
+          </a:p>
+        </p:txBody>
+      </p:sp>
+      <p:sp>
+        <p:nvSpPr>
+          <p:cNvPr id="23" name="TextBox 22"/>
+          <p:cNvSpPr txBox="1"/>
+          <p:nvPr/>
+        </p:nvSpPr>
+        <p:spPr>
+          <a:xfrm>
+            <a:off x="1927157" y="4755612"/>
+            <a:ext cx="614271" cy="253916"/>
+          </a:xfrm>
+          <a:prstGeom prst="rect">
+            <a:avLst/>
+          </a:prstGeom>
+          <a:noFill/>
+        </p:spPr>
+        <p:txBody>
+          <a:bodyPr wrap="none" rtlCol="0">
+            <a:spAutoFit/>
+          </a:bodyPr>
+          <a:lstStyle/>
+          <a:p>
+            <a:r>
+              <a:rPr lang="en-US" sz="1050" dirty="0" smtClean="0"/>
+              <a:t>Bifactor</a:t>
+            </a:r>
+            <a:endParaRPr lang="en-US" sz="1050" dirty="0"/>
+          </a:p>
+        </p:txBody>
+      </p:sp>
+      <p:sp>
+        <p:nvSpPr>
+          <p:cNvPr id="24" name="TextBox 23"/>
+          <p:cNvSpPr txBox="1"/>
+          <p:nvPr/>
+        </p:nvSpPr>
+        <p:spPr>
+          <a:xfrm>
+            <a:off x="2742951" y="4755612"/>
+            <a:ext cx="1043876" cy="253916"/>
+          </a:xfrm>
+          <a:prstGeom prst="rect">
+            <a:avLst/>
+          </a:prstGeom>
+          <a:noFill/>
+        </p:spPr>
+        <p:txBody>
+          <a:bodyPr wrap="none" rtlCol="0">
+            <a:spAutoFit/>
+          </a:bodyPr>
+          <a:lstStyle/>
+          <a:p>
+            <a:r>
+              <a:rPr lang="en-US" sz="1050" dirty="0" smtClean="0"/>
+              <a:t>BifactorOblique</a:t>
+            </a:r>
+            <a:endParaRPr lang="en-US" sz="1050" dirty="0"/>
+          </a:p>
+        </p:txBody>
+      </p:sp>
+      <p:sp>
+        <p:nvSpPr>
+          <p:cNvPr id="25" name="TextBox 24"/>
+          <p:cNvSpPr txBox="1"/>
+          <p:nvPr/>
+        </p:nvSpPr>
+        <p:spPr>
+          <a:xfrm rot="19656814">
+            <a:off x="85504" y="1446007"/>
+            <a:ext cx="686406" cy="253916"/>
+          </a:xfrm>
+          <a:prstGeom prst="rect">
+            <a:avLst/>
+          </a:prstGeom>
+          <a:noFill/>
+        </p:spPr>
+        <p:txBody>
+          <a:bodyPr wrap="none" rtlCol="0">
+            <a:spAutoFit/>
+          </a:bodyPr>
+          <a:lstStyle/>
+          <a:p>
+            <a:r>
+              <a:rPr lang="en-US" sz="1050" dirty="0" smtClean="0"/>
+              <a:t>Enzmann</a:t>
+            </a:r>
+            <a:endParaRPr lang="en-US" sz="1050" dirty="0"/>
+          </a:p>
+        </p:txBody>
+      </p:sp>
+      <p:sp>
+        <p:nvSpPr>
+          <p:cNvPr id="26" name="TextBox 25"/>
+          <p:cNvSpPr txBox="1"/>
+          <p:nvPr/>
+        </p:nvSpPr>
+        <p:spPr>
+          <a:xfrm rot="19656814">
+            <a:off x="309841" y="3205815"/>
+            <a:ext cx="497252" cy="253916"/>
+          </a:xfrm>
+          <a:prstGeom prst="rect">
+            <a:avLst/>
+          </a:prstGeom>
+          <a:noFill/>
+        </p:spPr>
+        <p:txBody>
+          <a:bodyPr wrap="none" rtlCol="0">
+            <a:spAutoFit/>
+          </a:bodyPr>
+          <a:lstStyle/>
+          <a:p>
+            <a:r>
+              <a:rPr lang="en-US" sz="1050" dirty="0" smtClean="0"/>
+              <a:t>MLFA</a:t>
+            </a:r>
+            <a:endParaRPr lang="en-US" sz="1050" dirty="0"/>
+          </a:p>
+        </p:txBody>
+      </p:sp>
+      <p:sp>
+        <p:nvSpPr>
+          <p:cNvPr id="27" name="TextBox 26"/>
+          <p:cNvSpPr txBox="1"/>
+          <p:nvPr/>
+        </p:nvSpPr>
+        <p:spPr>
+          <a:xfrm>
+            <a:off x="863117" y="3044917"/>
+            <a:ext cx="776175" cy="261610"/>
+          </a:xfrm>
+          <a:prstGeom prst="rect">
+            <a:avLst/>
+          </a:prstGeom>
+          <a:noFill/>
+        </p:spPr>
+        <p:txBody>
+          <a:bodyPr wrap="none" rtlCol="0">
+            <a:spAutoFit/>
+          </a:bodyPr>
+          <a:lstStyle/>
+          <a:p>
+            <a:r>
+              <a:rPr lang="en-US" sz="1050" dirty="0" smtClean="0"/>
+              <a:t>Unrotated</a:t>
+            </a:r>
+            <a:endParaRPr lang="en-US" sz="1050" dirty="0"/>
+          </a:p>
+        </p:txBody>
+      </p:sp>
+      <p:sp>
+        <p:nvSpPr>
+          <p:cNvPr id="28" name="TextBox 27"/>
+          <p:cNvSpPr txBox="1"/>
+          <p:nvPr/>
+        </p:nvSpPr>
+        <p:spPr>
+          <a:xfrm>
+            <a:off x="1945973" y="3046177"/>
+            <a:ext cx="631904" cy="253916"/>
+          </a:xfrm>
+          <a:prstGeom prst="rect">
+            <a:avLst/>
+          </a:prstGeom>
+          <a:noFill/>
+        </p:spPr>
+        <p:txBody>
+          <a:bodyPr wrap="none" rtlCol="0">
+            <a:spAutoFit/>
+          </a:bodyPr>
+          <a:lstStyle/>
+          <a:p>
+            <a:r>
+              <a:rPr lang="en-US" sz="1050" dirty="0" smtClean="0"/>
+              <a:t>Varimax</a:t>
+            </a:r>
+            <a:endParaRPr lang="en-US" sz="1050" dirty="0"/>
+          </a:p>
+        </p:txBody>
+      </p:sp>
+      <p:sp>
+        <p:nvSpPr>
+          <p:cNvPr id="29" name="TextBox 28"/>
+          <p:cNvSpPr txBox="1"/>
+          <p:nvPr/>
+        </p:nvSpPr>
+        <p:spPr>
+          <a:xfrm>
+            <a:off x="2964967" y="3044917"/>
+            <a:ext cx="599844" cy="253916"/>
+          </a:xfrm>
+          <a:prstGeom prst="rect">
+            <a:avLst/>
+          </a:prstGeom>
+          <a:noFill/>
+        </p:spPr>
+        <p:txBody>
+          <a:bodyPr wrap="none" rtlCol="0">
+            <a:spAutoFit/>
+          </a:bodyPr>
+          <a:lstStyle/>
+          <a:p>
+            <a:r>
+              <a:rPr lang="en-US" sz="1050" dirty="0" smtClean="0"/>
+              <a:t>Promax</a:t>
+            </a:r>
+            <a:endParaRPr lang="en-US" sz="1050" dirty="0"/>
+          </a:p>
+        </p:txBody>
+      </p:sp>
+      <p:pic>
+        <p:nvPicPr>
+          <p:cNvPr id="30" name="Picture 29"/>
+          <p:cNvPicPr>
+            <a:picLocks noChangeAspect="1"/>
+          </p:cNvPicPr>
+          <p:nvPr/>
+        </p:nvPicPr>
+        <p:blipFill>
+          <a:blip r:embed="rId5" cstate="print">
+            <a:extLst>
+              <a:ext uri="{28A0092B-C50C-407E-A947-70E740481C1C}">
+                <a14:useLocalDpi xmlns:a14="http://schemas.microsoft.com/office/drawing/2010/main" val="0"/>
+              </a:ext>
+            </a:extLst>
+          </a:blip>
+          <a:stretch>
+            <a:fillRect/>
+          </a:stretch>
+        </p:blipFill>
+        <p:spPr>
+          <a:xfrm rot="5400000">
+            <a:off x="2498571" y="2155032"/>
+            <a:ext cx="6019795" cy="3386134"/>
+          </a:xfrm>
+          <a:prstGeom prst="rect">
+            <a:avLst/>
+          </a:prstGeom>
+        </p:spPr>
+      </p:pic>
+      <p:sp>
+        <p:nvSpPr>
+          <p:cNvPr id="31" name="TextBox 30"/>
+          <p:cNvSpPr txBox="1"/>
+          <p:nvPr/>
+        </p:nvSpPr>
+        <p:spPr>
+          <a:xfrm>
+            <a:off x="5105399" y="514289"/>
+            <a:ext cx="1504860" cy="400110"/>
+          </a:xfrm>
+          <a:prstGeom prst="rect">
+            <a:avLst/>
+          </a:prstGeom>
+          <a:noFill/>
+        </p:spPr>
+        <p:txBody>
+          <a:bodyPr wrap="square" rtlCol="0">
+            <a:spAutoFit/>
+          </a:bodyPr>
+          <a:lstStyle/>
+          <a:p>
+            <a:r>
+              <a:rPr lang="en-US" sz="2000" dirty="0" smtClean="0"/>
+              <a:t>Quartimin</a:t>
+            </a:r>
+            <a:endParaRPr lang="en-US" sz="2000" dirty="0"/>
+          </a:p>
+        </p:txBody>
+      </p:sp>
+      <p:sp>
+        <p:nvSpPr>
+          <p:cNvPr id="32" name="TextBox 31"/>
+          <p:cNvSpPr txBox="1"/>
+          <p:nvPr/>
+        </p:nvSpPr>
+        <p:spPr>
+          <a:xfrm>
+            <a:off x="779086" y="413266"/>
+            <a:ext cx="865750" cy="369332"/>
+          </a:xfrm>
+          <a:prstGeom prst="rect">
+            <a:avLst/>
+          </a:prstGeom>
+          <a:noFill/>
+        </p:spPr>
+        <p:txBody>
+          <a:bodyPr wrap="none" rtlCol="0">
+            <a:spAutoFit/>
+          </a:bodyPr>
+          <a:lstStyle/>
+          <a:p>
+            <a:r>
+              <a:rPr lang="en-US" dirty="0" smtClean="0"/>
+              <a:t>Female</a:t>
+            </a:r>
+            <a:endParaRPr lang="en-US" dirty="0"/>
+          </a:p>
+        </p:txBody>
+      </p:sp>
+    </p:spTree>
+    <p:extLst>
+      <p:ext uri="{BB962C8B-B14F-4D97-AF65-F5344CB8AC3E}">
+        <p14:creationId xmlns:p14="http://schemas.microsoft.com/office/powerpoint/2010/main" val="1358330297"/>
+      </p:ext>
+    </p:extLst>
+  </p:cSld>
+  <p:clrMapOvr>
+    <a:masterClrMapping/>
+  </p:clrMapOvr>
+  <p:timing>
+    <p:tnLst>
+      <p:par>
+        <p:cTn id="1" dur="indefinite" restart="never" nodeType="tmRoot"/>
+      </p:par>
+    </p:tnLst>
+  </p:timing>
+</p:sld>
+</file>
+
+<file path=ppt/slides/slide4.xml><?xml version="1.0" encoding="utf-8"?>
+<p:sld xmlns:a="http://schemas.openxmlformats.org/drawingml/2006/main" xmlns:r="http://schemas.openxmlformats.org/officeDocument/2006/relationships" xmlns:p="http://schemas.openxmlformats.org/presentationml/2006/main">
+  <p:cSld>
+    <p:spTree>
+      <p:nvGrpSpPr>
+        <p:cNvPr id="1" name=""/>
+        <p:cNvGrpSpPr/>
+        <p:nvPr/>
+      </p:nvGrpSpPr>
+      <p:grpSpPr>
+        <a:xfrm>
+          <a:off x="0" y="0"/>
+          <a:ext cx="0" cy="0"/>
+          <a:chOff x="0" y="0"/>
+          <a:chExt cx="0" cy="0"/>
+        </a:xfrm>
+      </p:grpSpPr>
+      <p:pic>
+        <p:nvPicPr>
+          <p:cNvPr id="9" name="Picture 8"/>
+          <p:cNvPicPr>
+            <a:picLocks noChangeAspect="1"/>
+          </p:cNvPicPr>
+          <p:nvPr/>
+        </p:nvPicPr>
+        <p:blipFill>
+          <a:blip r:embed="rId2" cstate="print">
+            <a:extLst>
+              <a:ext uri="{28A0092B-C50C-407E-A947-70E740481C1C}">
+                <a14:useLocalDpi xmlns:a14="http://schemas.microsoft.com/office/drawing/2010/main" val="0"/>
+              </a:ext>
+            </a:extLst>
+          </a:blip>
+          <a:stretch>
+            <a:fillRect/>
+          </a:stretch>
+        </p:blipFill>
+        <p:spPr>
+          <a:xfrm rot="5400000">
+            <a:off x="437264" y="3620302"/>
+            <a:ext cx="1463043" cy="822961"/>
+          </a:xfrm>
+          <a:prstGeom prst="rect">
+            <a:avLst/>
+          </a:prstGeom>
+        </p:spPr>
+      </p:pic>
+      <p:pic>
+        <p:nvPicPr>
+          <p:cNvPr id="10" name="Picture 9"/>
+          <p:cNvPicPr>
+            <a:picLocks noChangeAspect="1"/>
+          </p:cNvPicPr>
+          <p:nvPr/>
+        </p:nvPicPr>
+        <p:blipFill>
+          <a:blip r:embed="rId3" cstate="print">
+            <a:extLst>
+              <a:ext uri="{28A0092B-C50C-407E-A947-70E740481C1C}">
+                <a14:useLocalDpi xmlns:a14="http://schemas.microsoft.com/office/drawing/2010/main" val="0"/>
+              </a:ext>
+            </a:extLst>
+          </a:blip>
+          <a:stretch>
+            <a:fillRect/>
+          </a:stretch>
+        </p:blipFill>
+        <p:spPr>
+          <a:xfrm rot="5400000">
+            <a:off x="1446029" y="3620302"/>
+            <a:ext cx="1463043" cy="822961"/>
+          </a:xfrm>
+          <a:prstGeom prst="rect">
+            <a:avLst/>
+          </a:prstGeom>
+        </p:spPr>
+      </p:pic>
+      <p:pic>
+        <p:nvPicPr>
+          <p:cNvPr id="11" name="Picture 10"/>
+          <p:cNvPicPr>
+            <a:picLocks noChangeAspect="1"/>
+          </p:cNvPicPr>
+          <p:nvPr/>
+        </p:nvPicPr>
+        <p:blipFill>
+          <a:blip r:embed="rId4" cstate="print">
+            <a:extLst>
+              <a:ext uri="{28A0092B-C50C-407E-A947-70E740481C1C}">
+                <a14:useLocalDpi xmlns:a14="http://schemas.microsoft.com/office/drawing/2010/main" val="0"/>
+              </a:ext>
+            </a:extLst>
+          </a:blip>
+          <a:stretch>
+            <a:fillRect/>
+          </a:stretch>
+        </p:blipFill>
+        <p:spPr>
+          <a:xfrm rot="5400000">
+            <a:off x="2454917" y="3620302"/>
+            <a:ext cx="1463043" cy="822961"/>
+          </a:xfrm>
+          <a:prstGeom prst="rect">
+            <a:avLst/>
+          </a:prstGeom>
+        </p:spPr>
+      </p:pic>
+      <p:pic>
+        <p:nvPicPr>
+          <p:cNvPr id="13" name="Picture 12"/>
+          <p:cNvPicPr>
+            <a:picLocks noChangeAspect="1"/>
+          </p:cNvPicPr>
+          <p:nvPr/>
+        </p:nvPicPr>
+        <p:blipFill>
+          <a:blip r:embed="rId5" cstate="print">
+            <a:extLst>
+              <a:ext uri="{28A0092B-C50C-407E-A947-70E740481C1C}">
+                <a14:useLocalDpi xmlns:a14="http://schemas.microsoft.com/office/drawing/2010/main" val="0"/>
+              </a:ext>
+            </a:extLst>
+          </a:blip>
+          <a:stretch>
+            <a:fillRect/>
+          </a:stretch>
+        </p:blipFill>
+        <p:spPr>
+          <a:xfrm rot="5400000">
+            <a:off x="437264" y="5296702"/>
+            <a:ext cx="1463043" cy="822961"/>
+          </a:xfrm>
+          <a:prstGeom prst="rect">
+            <a:avLst/>
+          </a:prstGeom>
+        </p:spPr>
+      </p:pic>
+      <p:pic>
+        <p:nvPicPr>
+          <p:cNvPr id="14" name="Picture 13"/>
+          <p:cNvPicPr>
+            <a:picLocks noChangeAspect="1"/>
+          </p:cNvPicPr>
+          <p:nvPr/>
+        </p:nvPicPr>
+        <p:blipFill>
+          <a:blip r:embed="rId6" cstate="print">
+            <a:extLst>
+              <a:ext uri="{28A0092B-C50C-407E-A947-70E740481C1C}">
+                <a14:useLocalDpi xmlns:a14="http://schemas.microsoft.com/office/drawing/2010/main" val="0"/>
+              </a:ext>
+            </a:extLst>
+          </a:blip>
+          <a:stretch>
+            <a:fillRect/>
+          </a:stretch>
+        </p:blipFill>
+        <p:spPr>
+          <a:xfrm rot="5400000">
+            <a:off x="1446091" y="5296702"/>
+            <a:ext cx="1463043" cy="822961"/>
+          </a:xfrm>
+          <a:prstGeom prst="rect">
+            <a:avLst/>
+          </a:prstGeom>
+        </p:spPr>
+      </p:pic>
+      <p:pic>
+        <p:nvPicPr>
+          <p:cNvPr id="15" name="Picture 14"/>
+          <p:cNvPicPr>
+            <a:picLocks noChangeAspect="1"/>
+          </p:cNvPicPr>
+          <p:nvPr/>
+        </p:nvPicPr>
+        <p:blipFill>
+          <a:blip r:embed="rId7" cstate="print">
+            <a:extLst>
+              <a:ext uri="{28A0092B-C50C-407E-A947-70E740481C1C}">
+                <a14:useLocalDpi xmlns:a14="http://schemas.microsoft.com/office/drawing/2010/main" val="0"/>
+              </a:ext>
+            </a:extLst>
+          </a:blip>
+          <a:stretch>
+            <a:fillRect/>
+          </a:stretch>
+        </p:blipFill>
+        <p:spPr>
+          <a:xfrm rot="5400000">
+            <a:off x="2454918" y="5296702"/>
+            <a:ext cx="1463043" cy="822961"/>
+          </a:xfrm>
+          <a:prstGeom prst="rect">
+            <a:avLst/>
+          </a:prstGeom>
+        </p:spPr>
+      </p:pic>
+      <p:pic>
+        <p:nvPicPr>
+          <p:cNvPr id="16" name="Picture 15"/>
+          <p:cNvPicPr>
+            <a:picLocks noChangeAspect="1"/>
+          </p:cNvPicPr>
+          <p:nvPr/>
+        </p:nvPicPr>
+        <p:blipFill>
+          <a:blip r:embed="rId8" cstate="print">
+            <a:extLst>
+              <a:ext uri="{28A0092B-C50C-407E-A947-70E740481C1C}">
+                <a14:useLocalDpi xmlns:a14="http://schemas.microsoft.com/office/drawing/2010/main" val="0"/>
+              </a:ext>
+            </a:extLst>
+          </a:blip>
+          <a:stretch>
+            <a:fillRect/>
+          </a:stretch>
+        </p:blipFill>
+        <p:spPr>
+          <a:xfrm rot="5400000">
+            <a:off x="437263" y="1943902"/>
+            <a:ext cx="1463043" cy="822961"/>
+          </a:xfrm>
+          <a:prstGeom prst="rect">
+            <a:avLst/>
+          </a:prstGeom>
+        </p:spPr>
+      </p:pic>
+      <p:pic>
+        <p:nvPicPr>
+          <p:cNvPr id="17" name="Picture 16"/>
+          <p:cNvPicPr>
+            <a:picLocks noChangeAspect="1"/>
+          </p:cNvPicPr>
+          <p:nvPr/>
+        </p:nvPicPr>
+        <p:blipFill>
+          <a:blip r:embed="rId9" cstate="print">
+            <a:extLst>
+              <a:ext uri="{28A0092B-C50C-407E-A947-70E740481C1C}">
+                <a14:useLocalDpi xmlns:a14="http://schemas.microsoft.com/office/drawing/2010/main" val="0"/>
+              </a:ext>
+            </a:extLst>
+          </a:blip>
+          <a:stretch>
+            <a:fillRect/>
+          </a:stretch>
+        </p:blipFill>
+        <p:spPr>
+          <a:xfrm rot="5400000">
+            <a:off x="1446091" y="1943902"/>
+            <a:ext cx="1463043" cy="822961"/>
+          </a:xfrm>
+          <a:prstGeom prst="rect">
+            <a:avLst/>
+          </a:prstGeom>
+        </p:spPr>
+      </p:pic>
+      <p:pic>
+        <p:nvPicPr>
+          <p:cNvPr id="18" name="Picture 17"/>
+          <p:cNvPicPr>
+            <a:picLocks noChangeAspect="1"/>
+          </p:cNvPicPr>
+          <p:nvPr/>
+        </p:nvPicPr>
+        <p:blipFill>
+          <a:blip r:embed="rId10" cstate="print">
+            <a:extLst>
+              <a:ext uri="{28A0092B-C50C-407E-A947-70E740481C1C}">
+                <a14:useLocalDpi xmlns:a14="http://schemas.microsoft.com/office/drawing/2010/main" val="0"/>
+              </a:ext>
+            </a:extLst>
+          </a:blip>
+          <a:stretch>
+            <a:fillRect/>
+          </a:stretch>
+        </p:blipFill>
+        <p:spPr>
+          <a:xfrm rot="5400000">
+            <a:off x="2454918" y="1943902"/>
+            <a:ext cx="1463043" cy="822961"/>
+          </a:xfrm>
+          <a:prstGeom prst="rect">
+            <a:avLst/>
+          </a:prstGeom>
+        </p:spPr>
+      </p:pic>
+      <p:sp>
+        <p:nvSpPr>
+          <p:cNvPr id="19" name="TextBox 18"/>
+          <p:cNvSpPr txBox="1"/>
+          <p:nvPr/>
+        </p:nvSpPr>
+        <p:spPr>
+          <a:xfrm>
+            <a:off x="869701" y="1317790"/>
+            <a:ext cx="776175" cy="261610"/>
+          </a:xfrm>
+          <a:prstGeom prst="rect">
+            <a:avLst/>
+          </a:prstGeom>
+          <a:noFill/>
+        </p:spPr>
+        <p:txBody>
+          <a:bodyPr wrap="none" rtlCol="0">
+            <a:spAutoFit/>
+          </a:bodyPr>
+          <a:lstStyle/>
+          <a:p>
+            <a:r>
+              <a:rPr lang="en-US" sz="1050" dirty="0" smtClean="0"/>
+              <a:t>Unrotated</a:t>
+            </a:r>
+            <a:endParaRPr lang="en-US" sz="1050" dirty="0"/>
+          </a:p>
+        </p:txBody>
+      </p:sp>
+      <p:sp>
+        <p:nvSpPr>
+          <p:cNvPr id="20" name="TextBox 19"/>
+          <p:cNvSpPr txBox="1"/>
+          <p:nvPr/>
+        </p:nvSpPr>
+        <p:spPr>
+          <a:xfrm>
+            <a:off x="1952557" y="1319050"/>
+            <a:ext cx="631904" cy="253916"/>
+          </a:xfrm>
+          <a:prstGeom prst="rect">
+            <a:avLst/>
+          </a:prstGeom>
+          <a:noFill/>
+        </p:spPr>
+        <p:txBody>
+          <a:bodyPr wrap="none" rtlCol="0">
+            <a:spAutoFit/>
+          </a:bodyPr>
+          <a:lstStyle/>
+          <a:p>
+            <a:r>
+              <a:rPr lang="en-US" sz="1050" dirty="0" smtClean="0"/>
+              <a:t>Varimax</a:t>
+            </a:r>
+            <a:endParaRPr lang="en-US" sz="1050" dirty="0"/>
+          </a:p>
+        </p:txBody>
+      </p:sp>
+      <p:sp>
+        <p:nvSpPr>
+          <p:cNvPr id="21" name="TextBox 20"/>
+          <p:cNvSpPr txBox="1"/>
+          <p:nvPr/>
+        </p:nvSpPr>
+        <p:spPr>
+          <a:xfrm>
+            <a:off x="2971551" y="1317790"/>
+            <a:ext cx="599844" cy="253916"/>
+          </a:xfrm>
+          <a:prstGeom prst="rect">
+            <a:avLst/>
+          </a:prstGeom>
+          <a:noFill/>
+        </p:spPr>
+        <p:txBody>
+          <a:bodyPr wrap="none" rtlCol="0">
+            <a:spAutoFit/>
+          </a:bodyPr>
+          <a:lstStyle/>
+          <a:p>
+            <a:r>
+              <a:rPr lang="en-US" sz="1050" dirty="0" smtClean="0"/>
+              <a:t>Promax</a:t>
+            </a:r>
+            <a:endParaRPr lang="en-US" sz="1050" dirty="0"/>
+          </a:p>
+        </p:txBody>
+      </p:sp>
+      <p:sp>
+        <p:nvSpPr>
+          <p:cNvPr id="22" name="TextBox 21"/>
+          <p:cNvSpPr txBox="1"/>
+          <p:nvPr/>
+        </p:nvSpPr>
+        <p:spPr>
+          <a:xfrm>
+            <a:off x="786528" y="4724399"/>
+            <a:ext cx="740908" cy="253916"/>
+          </a:xfrm>
+          <a:prstGeom prst="rect">
+            <a:avLst/>
+          </a:prstGeom>
+          <a:noFill/>
+        </p:spPr>
+        <p:txBody>
+          <a:bodyPr wrap="none" rtlCol="0">
+            <a:spAutoFit/>
+          </a:bodyPr>
+          <a:lstStyle/>
+          <a:p>
+            <a:r>
+              <a:rPr lang="en-US" sz="1050" dirty="0" smtClean="0"/>
+              <a:t>Quartimin</a:t>
+            </a:r>
+            <a:endParaRPr lang="en-US" sz="1050" dirty="0"/>
+          </a:p>
+        </p:txBody>
+      </p:sp>
+      <p:sp>
+        <p:nvSpPr>
+          <p:cNvPr id="23" name="TextBox 22"/>
+          <p:cNvSpPr txBox="1"/>
+          <p:nvPr/>
+        </p:nvSpPr>
+        <p:spPr>
+          <a:xfrm>
+            <a:off x="1927157" y="4755612"/>
+            <a:ext cx="614271" cy="253916"/>
+          </a:xfrm>
+          <a:prstGeom prst="rect">
+            <a:avLst/>
+          </a:prstGeom>
+          <a:noFill/>
+        </p:spPr>
+        <p:txBody>
+          <a:bodyPr wrap="none" rtlCol="0">
+            <a:spAutoFit/>
+          </a:bodyPr>
+          <a:lstStyle/>
+          <a:p>
+            <a:r>
+              <a:rPr lang="en-US" sz="1050" dirty="0" smtClean="0"/>
+              <a:t>Bifactor</a:t>
+            </a:r>
+            <a:endParaRPr lang="en-US" sz="1050" dirty="0"/>
+          </a:p>
+        </p:txBody>
+      </p:sp>
+      <p:sp>
+        <p:nvSpPr>
+          <p:cNvPr id="24" name="TextBox 23"/>
+          <p:cNvSpPr txBox="1"/>
+          <p:nvPr/>
+        </p:nvSpPr>
+        <p:spPr>
+          <a:xfrm>
+            <a:off x="2742951" y="4755612"/>
+            <a:ext cx="1043876" cy="253916"/>
+          </a:xfrm>
+          <a:prstGeom prst="rect">
+            <a:avLst/>
+          </a:prstGeom>
+          <a:noFill/>
+        </p:spPr>
+        <p:txBody>
+          <a:bodyPr wrap="none" rtlCol="0">
+            <a:spAutoFit/>
+          </a:bodyPr>
+          <a:lstStyle/>
+          <a:p>
+            <a:r>
+              <a:rPr lang="en-US" sz="1050" dirty="0" smtClean="0"/>
+              <a:t>BifactorOblique</a:t>
+            </a:r>
+            <a:endParaRPr lang="en-US" sz="1050" dirty="0"/>
+          </a:p>
+        </p:txBody>
+      </p:sp>
+      <p:sp>
+        <p:nvSpPr>
+          <p:cNvPr id="25" name="TextBox 24"/>
+          <p:cNvSpPr txBox="1"/>
+          <p:nvPr/>
+        </p:nvSpPr>
+        <p:spPr>
+          <a:xfrm rot="19656814">
+            <a:off x="85504" y="1446007"/>
+            <a:ext cx="686406" cy="253916"/>
+          </a:xfrm>
+          <a:prstGeom prst="rect">
+            <a:avLst/>
+          </a:prstGeom>
+          <a:noFill/>
+        </p:spPr>
+        <p:txBody>
+          <a:bodyPr wrap="none" rtlCol="0">
+            <a:spAutoFit/>
+          </a:bodyPr>
+          <a:lstStyle/>
+          <a:p>
+            <a:r>
+              <a:rPr lang="en-US" sz="1050" dirty="0" smtClean="0"/>
+              <a:t>Enzmann</a:t>
+            </a:r>
+            <a:endParaRPr lang="en-US" sz="1050" dirty="0"/>
+          </a:p>
+        </p:txBody>
+      </p:sp>
+      <p:sp>
+        <p:nvSpPr>
+          <p:cNvPr id="26" name="TextBox 25"/>
+          <p:cNvSpPr txBox="1"/>
+          <p:nvPr/>
+        </p:nvSpPr>
+        <p:spPr>
+          <a:xfrm rot="19656814">
+            <a:off x="309841" y="3205815"/>
+            <a:ext cx="497252" cy="253916"/>
+          </a:xfrm>
+          <a:prstGeom prst="rect">
+            <a:avLst/>
+          </a:prstGeom>
+          <a:noFill/>
+        </p:spPr>
+        <p:txBody>
+          <a:bodyPr wrap="none" rtlCol="0">
+            <a:spAutoFit/>
+          </a:bodyPr>
+          <a:lstStyle/>
+          <a:p>
+            <a:r>
+              <a:rPr lang="en-US" sz="1050" dirty="0" smtClean="0"/>
+              <a:t>MLFA</a:t>
+            </a:r>
+            <a:endParaRPr lang="en-US" sz="1050" dirty="0"/>
+          </a:p>
+        </p:txBody>
+      </p:sp>
+      <p:sp>
+        <p:nvSpPr>
+          <p:cNvPr id="27" name="TextBox 26"/>
+          <p:cNvSpPr txBox="1"/>
+          <p:nvPr/>
+        </p:nvSpPr>
+        <p:spPr>
+          <a:xfrm>
+            <a:off x="863117" y="3044917"/>
+            <a:ext cx="776175" cy="261610"/>
+          </a:xfrm>
+          <a:prstGeom prst="rect">
+            <a:avLst/>
+          </a:prstGeom>
+          <a:noFill/>
+        </p:spPr>
+        <p:txBody>
+          <a:bodyPr wrap="none" rtlCol="0">
+            <a:spAutoFit/>
+          </a:bodyPr>
+          <a:lstStyle/>
+          <a:p>
+            <a:r>
+              <a:rPr lang="en-US" sz="1050" dirty="0" smtClean="0"/>
+              <a:t>Unrotated</a:t>
+            </a:r>
+            <a:endParaRPr lang="en-US" sz="1050" dirty="0"/>
+          </a:p>
+        </p:txBody>
+      </p:sp>
+      <p:sp>
+        <p:nvSpPr>
+          <p:cNvPr id="28" name="TextBox 27"/>
+          <p:cNvSpPr txBox="1"/>
+          <p:nvPr/>
+        </p:nvSpPr>
+        <p:spPr>
+          <a:xfrm>
+            <a:off x="1945973" y="3046177"/>
+            <a:ext cx="631904" cy="253916"/>
+          </a:xfrm>
+          <a:prstGeom prst="rect">
+            <a:avLst/>
+          </a:prstGeom>
+          <a:noFill/>
+        </p:spPr>
+        <p:txBody>
+          <a:bodyPr wrap="none" rtlCol="0">
+            <a:spAutoFit/>
+          </a:bodyPr>
+          <a:lstStyle/>
+          <a:p>
+            <a:r>
+              <a:rPr lang="en-US" sz="1050" dirty="0" smtClean="0"/>
+              <a:t>Varimax</a:t>
+            </a:r>
+            <a:endParaRPr lang="en-US" sz="1050" dirty="0"/>
+          </a:p>
+        </p:txBody>
+      </p:sp>
+      <p:sp>
+        <p:nvSpPr>
+          <p:cNvPr id="29" name="TextBox 28"/>
+          <p:cNvSpPr txBox="1"/>
+          <p:nvPr/>
+        </p:nvSpPr>
+        <p:spPr>
+          <a:xfrm>
+            <a:off x="2964967" y="3044917"/>
+            <a:ext cx="599844" cy="253916"/>
+          </a:xfrm>
+          <a:prstGeom prst="rect">
+            <a:avLst/>
+          </a:prstGeom>
+          <a:noFill/>
+        </p:spPr>
+        <p:txBody>
+          <a:bodyPr wrap="none" rtlCol="0">
+            <a:spAutoFit/>
+          </a:bodyPr>
+          <a:lstStyle/>
+          <a:p>
+            <a:r>
+              <a:rPr lang="en-US" sz="1050" dirty="0" smtClean="0"/>
+              <a:t>Promax</a:t>
+            </a:r>
+            <a:endParaRPr lang="en-US" sz="1050" dirty="0"/>
+          </a:p>
+        </p:txBody>
+      </p:sp>
+      <p:pic>
+        <p:nvPicPr>
+          <p:cNvPr id="30" name="Picture 29"/>
+          <p:cNvPicPr>
+            <a:picLocks noChangeAspect="1"/>
+          </p:cNvPicPr>
+          <p:nvPr/>
+        </p:nvPicPr>
+        <p:blipFill>
+          <a:blip r:embed="rId5" cstate="print">
+            <a:extLst>
+              <a:ext uri="{28A0092B-C50C-407E-A947-70E740481C1C}">
+                <a14:useLocalDpi xmlns:a14="http://schemas.microsoft.com/office/drawing/2010/main" val="0"/>
+              </a:ext>
+            </a:extLst>
+          </a:blip>
+          <a:stretch>
+            <a:fillRect/>
+          </a:stretch>
+        </p:blipFill>
+        <p:spPr>
+          <a:xfrm rot="5400000">
+            <a:off x="2498569" y="2155032"/>
+            <a:ext cx="6019800" cy="3386135"/>
+          </a:xfrm>
+          <a:prstGeom prst="rect">
+            <a:avLst/>
+          </a:prstGeom>
+        </p:spPr>
+      </p:pic>
+      <p:sp>
+        <p:nvSpPr>
+          <p:cNvPr id="31" name="TextBox 30"/>
+          <p:cNvSpPr txBox="1"/>
+          <p:nvPr/>
+        </p:nvSpPr>
+        <p:spPr>
+          <a:xfrm>
+            <a:off x="5105399" y="514289"/>
+            <a:ext cx="1504860" cy="400110"/>
+          </a:xfrm>
+          <a:prstGeom prst="rect">
+            <a:avLst/>
+          </a:prstGeom>
+          <a:noFill/>
+        </p:spPr>
+        <p:txBody>
+          <a:bodyPr wrap="square" rtlCol="0">
+            <a:spAutoFit/>
+          </a:bodyPr>
+          <a:lstStyle/>
+          <a:p>
+            <a:r>
+              <a:rPr lang="en-US" sz="2000" dirty="0" smtClean="0"/>
+              <a:t>Quartimin</a:t>
+            </a:r>
+            <a:endParaRPr lang="en-US" sz="2000" dirty="0"/>
+          </a:p>
+        </p:txBody>
+      </p:sp>
+      <p:sp>
+        <p:nvSpPr>
+          <p:cNvPr id="32" name="TextBox 31"/>
+          <p:cNvSpPr txBox="1"/>
+          <p:nvPr/>
+        </p:nvSpPr>
+        <p:spPr>
+          <a:xfrm>
+            <a:off x="779086" y="413266"/>
+            <a:ext cx="1148071" cy="369332"/>
+          </a:xfrm>
+          <a:prstGeom prst="rect">
+            <a:avLst/>
+          </a:prstGeom>
+          <a:noFill/>
+        </p:spPr>
+        <p:txBody>
+          <a:bodyPr wrap="none" rtlCol="0">
+            <a:spAutoFit/>
+          </a:bodyPr>
+          <a:lstStyle/>
+          <a:p>
+            <a:r>
+              <a:rPr lang="en-US" dirty="0" smtClean="0"/>
+              <a:t>Combined</a:t>
+            </a:r>
+            <a:endParaRPr lang="en-US" dirty="0"/>
+          </a:p>
+        </p:txBody>
+      </p:sp>
+    </p:spTree>
+    <p:extLst>
+      <p:ext uri="{BB962C8B-B14F-4D97-AF65-F5344CB8AC3E}">
+        <p14:creationId xmlns:p14="http://schemas.microsoft.com/office/powerpoint/2010/main" val="2524584226"/>
       </p:ext>
     </p:extLst>
   </p:cSld>

</xml_diff>